<commit_message>
added tikz images to presentation; made slide on canonical mpos
</commit_message>
<xml_diff>
--- a/presentation/Term_Project_XTRG_Presentation.pptx
+++ b/presentation/Term_Project_XTRG_Presentation.pptx
@@ -202,7 +202,7 @@
             <a:fld id="{0C1F448F-86F9-4731-A83D-96FCA7389CBB}" type="datetimeFigureOut">
               <a:rPr lang="en-US" smtClean="0"/>
               <a:pPr/>
-              <a:t>7/9/2025</a:t>
+              <a:t>7/11/25</a:t>
             </a:fld>
             <a:endParaRPr lang="en-US" dirty="0"/>
           </a:p>
@@ -967,7 +967,7 @@
             <a:fld id="{5E4FD71B-E960-4BE4-B463-A12BB7700A42}" type="datetimeFigureOut">
               <a:rPr lang="en-US" smtClean="0"/>
               <a:pPr/>
-              <a:t>7/9/2025</a:t>
+              <a:t>7/11/25</a:t>
             </a:fld>
             <a:endParaRPr lang="en-US" dirty="0"/>
           </a:p>
@@ -1265,7 +1265,7 @@
             <a:fld id="{5E4FD71B-E960-4BE4-B463-A12BB7700A42}" type="datetimeFigureOut">
               <a:rPr lang="en-US" smtClean="0"/>
               <a:pPr/>
-              <a:t>7/9/2025</a:t>
+              <a:t>7/11/25</a:t>
             </a:fld>
             <a:endParaRPr lang="en-US" dirty="0"/>
           </a:p>
@@ -1573,7 +1573,7 @@
             <a:fld id="{5E4FD71B-E960-4BE4-B463-A12BB7700A42}" type="datetimeFigureOut">
               <a:rPr lang="en-US" smtClean="0"/>
               <a:pPr/>
-              <a:t>7/9/2025</a:t>
+              <a:t>7/11/25</a:t>
             </a:fld>
             <a:endParaRPr lang="en-US" dirty="0"/>
           </a:p>
@@ -1871,7 +1871,7 @@
             <a:fld id="{5E4FD71B-E960-4BE4-B463-A12BB7700A42}" type="datetimeFigureOut">
               <a:rPr lang="en-US" smtClean="0"/>
               <a:pPr/>
-              <a:t>7/9/2025</a:t>
+              <a:t>7/11/25</a:t>
             </a:fld>
             <a:endParaRPr lang="en-US" dirty="0"/>
           </a:p>
@@ -2226,7 +2226,7 @@
             <a:fld id="{5E4FD71B-E960-4BE4-B463-A12BB7700A42}" type="datetimeFigureOut">
               <a:rPr lang="en-US" smtClean="0"/>
               <a:pPr/>
-              <a:t>7/9/2025</a:t>
+              <a:t>7/11/25</a:t>
             </a:fld>
             <a:endParaRPr lang="en-US" dirty="0"/>
           </a:p>
@@ -2607,7 +2607,7 @@
             <a:fld id="{5E4FD71B-E960-4BE4-B463-A12BB7700A42}" type="datetimeFigureOut">
               <a:rPr lang="en-US" smtClean="0"/>
               <a:pPr/>
-              <a:t>7/9/2025</a:t>
+              <a:t>7/11/25</a:t>
             </a:fld>
             <a:endParaRPr lang="en-US" dirty="0"/>
           </a:p>
@@ -3135,7 +3135,7 @@
             <a:fld id="{5E4FD71B-E960-4BE4-B463-A12BB7700A42}" type="datetimeFigureOut">
               <a:rPr lang="en-US" smtClean="0"/>
               <a:pPr/>
-              <a:t>7/9/2025</a:t>
+              <a:t>7/11/25</a:t>
             </a:fld>
             <a:endParaRPr lang="en-US" dirty="0"/>
           </a:p>
@@ -3360,7 +3360,7 @@
             <a:fld id="{5E4FD71B-E960-4BE4-B463-A12BB7700A42}" type="datetimeFigureOut">
               <a:rPr lang="en-US" smtClean="0"/>
               <a:pPr/>
-              <a:t>7/9/2025</a:t>
+              <a:t>7/11/25</a:t>
             </a:fld>
             <a:endParaRPr lang="en-US" dirty="0"/>
           </a:p>
@@ -3553,7 +3553,7 @@
             <a:fld id="{5E4FD71B-E960-4BE4-B463-A12BB7700A42}" type="datetimeFigureOut">
               <a:rPr lang="en-US" smtClean="0"/>
               <a:pPr/>
-              <a:t>7/9/2025</a:t>
+              <a:t>7/11/25</a:t>
             </a:fld>
             <a:endParaRPr lang="en-US" dirty="0"/>
           </a:p>
@@ -3944,7 +3944,7 @@
             <a:fld id="{5E4FD71B-E960-4BE4-B463-A12BB7700A42}" type="datetimeFigureOut">
               <a:rPr lang="en-US" smtClean="0"/>
               <a:pPr/>
-              <a:t>7/9/2025</a:t>
+              <a:t>7/11/25</a:t>
             </a:fld>
             <a:endParaRPr lang="en-US" dirty="0"/>
           </a:p>
@@ -4312,7 +4312,7 @@
             <a:fld id="{5E4FD71B-E960-4BE4-B463-A12BB7700A42}" type="datetimeFigureOut">
               <a:rPr lang="en-US" smtClean="0"/>
               <a:pPr/>
-              <a:t>7/9/2025</a:t>
+              <a:t>7/11/25</a:t>
             </a:fld>
             <a:endParaRPr lang="en-US" dirty="0"/>
           </a:p>
@@ -4629,7 +4629,7 @@
             <a:fld id="{5E4FD71B-E960-4BE4-B463-A12BB7700A42}" type="datetimeFigureOut">
               <a:rPr lang="en-US" smtClean="0"/>
               <a:pPr/>
-              <a:t>7/9/2025</a:t>
+              <a:t>7/11/25</a:t>
             </a:fld>
             <a:endParaRPr lang="en-US" dirty="0"/>
           </a:p>
@@ -5636,12 +5636,12 @@
           <a:graphicData uri="http://schemas.openxmlformats.org/presentationml/2006/ole">
             <mc:AlternateContent xmlns:mc="http://schemas.openxmlformats.org/markup-compatibility/2006">
               <mc:Choice xmlns:v="urn:schemas-microsoft-com:vml" Requires="v">
-                <p:oleObj name="think-cell Slide" r:id="rId3" imgW="479" imgH="478" progId="TCLayout.ActiveDocument.1">
+                <p:oleObj name="think-cell Slide" r:id="rId4" imgW="479" imgH="478" progId="TCLayout.ActiveDocument.1">
                   <p:embed/>
                 </p:oleObj>
               </mc:Choice>
               <mc:Fallback>
-                <p:oleObj name="think-cell Slide" r:id="rId3" imgW="479" imgH="478" progId="TCLayout.ActiveDocument.1">
+                <p:oleObj name="think-cell Slide" r:id="rId4" imgW="479" imgH="478" progId="TCLayout.ActiveDocument.1">
                   <p:embed/>
                   <p:pic>
                     <p:nvPicPr>
@@ -5650,7 +5650,7 @@
                       <p:nvPr/>
                     </p:nvPicPr>
                     <p:blipFill>
-                      <a:blip r:embed="rId4"/>
+                      <a:blip r:embed="rId5"/>
                       <a:stretch>
                         <a:fillRect/>
                       </a:stretch>
@@ -5932,7 +5932,7 @@
         </p:nvSpPr>
         <p:spPr>
           <a:xfrm>
-            <a:off x="8552688" y="6376708"/>
+            <a:off x="8732520" y="6440495"/>
             <a:ext cx="3639312" cy="307777"/>
           </a:xfrm>
           <a:prstGeom prst="rect">
@@ -5969,6 +5969,1418 @@
               </a:rPr>
               <a:t> (2020)</a:t>
             </a:r>
+          </a:p>
+        </p:txBody>
+      </p:sp>
+      <p:sp>
+        <p:nvSpPr>
+          <p:cNvPr id="7" name="Untertitel 2 2">
+            <a:extLst>
+              <a:ext uri="{FF2B5EF4-FFF2-40B4-BE49-F238E27FC236}">
+                <a16:creationId xmlns:a16="http://schemas.microsoft.com/office/drawing/2014/main" id="{19C2C2C7-6AF5-6909-2F7B-4DE73256B610}"/>
+              </a:ext>
+            </a:extLst>
+          </p:cNvPr>
+          <p:cNvSpPr txBox="1">
+            <a:spLocks/>
+          </p:cNvSpPr>
+          <p:nvPr/>
+        </p:nvSpPr>
+        <p:spPr>
+          <a:xfrm>
+            <a:off x="440579" y="1398131"/>
+            <a:ext cx="1971335" cy="1094831"/>
+          </a:xfrm>
+          <a:prstGeom prst="rect">
+            <a:avLst/>
+          </a:prstGeom>
+        </p:spPr>
+        <p:txBody>
+          <a:bodyPr vert="horz" lIns="91440" tIns="45720" rIns="91440" bIns="45720" rtlCol="0">
+            <a:normAutofit/>
+          </a:bodyPr>
+          <a:lstStyle>
+            <a:lvl1pPr marL="228600" indent="-228600" algn="l" defTabSz="914400" rtl="0" eaLnBrk="1" latinLnBrk="0" hangingPunct="1">
+              <a:lnSpc>
+                <a:spcPct val="90000"/>
+              </a:lnSpc>
+              <a:spcBef>
+                <a:spcPts val="1000"/>
+              </a:spcBef>
+              <a:buFont typeface="Arial" panose="020B0604020202020204" pitchFamily="34" charset="0"/>
+              <a:buChar char="•"/>
+              <a:defRPr sz="2800" kern="1200">
+                <a:solidFill>
+                  <a:schemeClr val="tx1"/>
+                </a:solidFill>
+                <a:latin typeface="+mn-lt"/>
+                <a:ea typeface="+mn-ea"/>
+                <a:cs typeface="+mn-cs"/>
+              </a:defRPr>
+            </a:lvl1pPr>
+            <a:lvl2pPr marL="685800" indent="-228600" algn="l" defTabSz="914400" rtl="0" eaLnBrk="1" latinLnBrk="0" hangingPunct="1">
+              <a:lnSpc>
+                <a:spcPct val="90000"/>
+              </a:lnSpc>
+              <a:spcBef>
+                <a:spcPts val="500"/>
+              </a:spcBef>
+              <a:buFont typeface="Arial" panose="020B0604020202020204" pitchFamily="34" charset="0"/>
+              <a:buChar char="•"/>
+              <a:defRPr sz="2400" kern="1200">
+                <a:solidFill>
+                  <a:schemeClr val="tx1"/>
+                </a:solidFill>
+                <a:latin typeface="+mn-lt"/>
+                <a:ea typeface="+mn-ea"/>
+                <a:cs typeface="+mn-cs"/>
+              </a:defRPr>
+            </a:lvl2pPr>
+            <a:lvl3pPr marL="1143000" indent="-228600" algn="l" defTabSz="914400" rtl="0" eaLnBrk="1" latinLnBrk="0" hangingPunct="1">
+              <a:lnSpc>
+                <a:spcPct val="90000"/>
+              </a:lnSpc>
+              <a:spcBef>
+                <a:spcPts val="500"/>
+              </a:spcBef>
+              <a:buFont typeface="Arial" panose="020B0604020202020204" pitchFamily="34" charset="0"/>
+              <a:buChar char="•"/>
+              <a:defRPr sz="2000" kern="1200">
+                <a:solidFill>
+                  <a:schemeClr val="tx1"/>
+                </a:solidFill>
+                <a:latin typeface="+mn-lt"/>
+                <a:ea typeface="+mn-ea"/>
+                <a:cs typeface="+mn-cs"/>
+              </a:defRPr>
+            </a:lvl3pPr>
+            <a:lvl4pPr marL="1600200" indent="-228600" algn="l" defTabSz="914400" rtl="0" eaLnBrk="1" latinLnBrk="0" hangingPunct="1">
+              <a:lnSpc>
+                <a:spcPct val="90000"/>
+              </a:lnSpc>
+              <a:spcBef>
+                <a:spcPts val="500"/>
+              </a:spcBef>
+              <a:buFont typeface="Arial" panose="020B0604020202020204" pitchFamily="34" charset="0"/>
+              <a:buChar char="•"/>
+              <a:defRPr sz="1800" kern="1200">
+                <a:solidFill>
+                  <a:schemeClr val="tx1"/>
+                </a:solidFill>
+                <a:latin typeface="+mn-lt"/>
+                <a:ea typeface="+mn-ea"/>
+                <a:cs typeface="+mn-cs"/>
+              </a:defRPr>
+            </a:lvl4pPr>
+            <a:lvl5pPr marL="2057400" indent="-228600" algn="l" defTabSz="914400" rtl="0" eaLnBrk="1" latinLnBrk="0" hangingPunct="1">
+              <a:lnSpc>
+                <a:spcPct val="90000"/>
+              </a:lnSpc>
+              <a:spcBef>
+                <a:spcPts val="500"/>
+              </a:spcBef>
+              <a:buFont typeface="Arial" panose="020B0604020202020204" pitchFamily="34" charset="0"/>
+              <a:buChar char="•"/>
+              <a:defRPr sz="1800" kern="1200">
+                <a:solidFill>
+                  <a:schemeClr val="tx1"/>
+                </a:solidFill>
+                <a:latin typeface="+mn-lt"/>
+                <a:ea typeface="+mn-ea"/>
+                <a:cs typeface="+mn-cs"/>
+              </a:defRPr>
+            </a:lvl5pPr>
+            <a:lvl6pPr marL="2514600" indent="-228600" algn="l" defTabSz="914400" rtl="0" eaLnBrk="1" latinLnBrk="0" hangingPunct="1">
+              <a:lnSpc>
+                <a:spcPct val="90000"/>
+              </a:lnSpc>
+              <a:spcBef>
+                <a:spcPts val="500"/>
+              </a:spcBef>
+              <a:buFont typeface="Arial" panose="020B0604020202020204" pitchFamily="34" charset="0"/>
+              <a:buChar char="•"/>
+              <a:defRPr sz="1800" kern="1200">
+                <a:solidFill>
+                  <a:schemeClr val="tx1"/>
+                </a:solidFill>
+                <a:latin typeface="+mn-lt"/>
+                <a:ea typeface="+mn-ea"/>
+                <a:cs typeface="+mn-cs"/>
+              </a:defRPr>
+            </a:lvl6pPr>
+            <a:lvl7pPr marL="2971800" indent="-228600" algn="l" defTabSz="914400" rtl="0" eaLnBrk="1" latinLnBrk="0" hangingPunct="1">
+              <a:lnSpc>
+                <a:spcPct val="90000"/>
+              </a:lnSpc>
+              <a:spcBef>
+                <a:spcPts val="500"/>
+              </a:spcBef>
+              <a:buFont typeface="Arial" panose="020B0604020202020204" pitchFamily="34" charset="0"/>
+              <a:buChar char="•"/>
+              <a:defRPr sz="1800" kern="1200">
+                <a:solidFill>
+                  <a:schemeClr val="tx1"/>
+                </a:solidFill>
+                <a:latin typeface="+mn-lt"/>
+                <a:ea typeface="+mn-ea"/>
+                <a:cs typeface="+mn-cs"/>
+              </a:defRPr>
+            </a:lvl7pPr>
+            <a:lvl8pPr marL="3429000" indent="-228600" algn="l" defTabSz="914400" rtl="0" eaLnBrk="1" latinLnBrk="0" hangingPunct="1">
+              <a:lnSpc>
+                <a:spcPct val="90000"/>
+              </a:lnSpc>
+              <a:spcBef>
+                <a:spcPts val="500"/>
+              </a:spcBef>
+              <a:buFont typeface="Arial" panose="020B0604020202020204" pitchFamily="34" charset="0"/>
+              <a:buChar char="•"/>
+              <a:defRPr sz="1800" kern="1200">
+                <a:solidFill>
+                  <a:schemeClr val="tx1"/>
+                </a:solidFill>
+                <a:latin typeface="+mn-lt"/>
+                <a:ea typeface="+mn-ea"/>
+                <a:cs typeface="+mn-cs"/>
+              </a:defRPr>
+            </a:lvl8pPr>
+            <a:lvl9pPr marL="3886200" indent="-228600" algn="l" defTabSz="914400" rtl="0" eaLnBrk="1" latinLnBrk="0" hangingPunct="1">
+              <a:lnSpc>
+                <a:spcPct val="90000"/>
+              </a:lnSpc>
+              <a:spcBef>
+                <a:spcPts val="500"/>
+              </a:spcBef>
+              <a:buFont typeface="Arial" panose="020B0604020202020204" pitchFamily="34" charset="0"/>
+              <a:buChar char="•"/>
+              <a:defRPr sz="1800" kern="1200">
+                <a:solidFill>
+                  <a:schemeClr val="tx1"/>
+                </a:solidFill>
+                <a:latin typeface="+mn-lt"/>
+                <a:ea typeface="+mn-ea"/>
+                <a:cs typeface="+mn-cs"/>
+              </a:defRPr>
+            </a:lvl9pPr>
+          </a:lstStyle>
+          <a:p>
+            <a:pPr marL="0" indent="0">
+              <a:buNone/>
+            </a:pPr>
+            <a:r>
+              <a:rPr lang="en-US" sz="2400" noProof="0" dirty="0">
+                <a:solidFill>
+                  <a:schemeClr val="tx2">
+                    <a:lumMod val="75000"/>
+                    <a:lumOff val="25000"/>
+                  </a:schemeClr>
+                </a:solidFill>
+                <a:latin typeface="Bahnschrift SemiCondensed" panose="020B0502040204020203" pitchFamily="34" charset="0"/>
+              </a:rPr>
+              <a:t>Canonical forms of MPOs</a:t>
+            </a:r>
+            <a:endParaRPr lang="en-US" sz="2400" noProof="0" dirty="0">
+              <a:solidFill>
+                <a:schemeClr val="tx2">
+                  <a:lumMod val="75000"/>
+                  <a:lumOff val="25000"/>
+                </a:schemeClr>
+              </a:solidFill>
+            </a:endParaRPr>
+          </a:p>
+        </p:txBody>
+      </p:sp>
+      <p:sp>
+        <p:nvSpPr>
+          <p:cNvPr id="9" name="Untertitel 2 6 1">
+            <a:extLst>
+              <a:ext uri="{FF2B5EF4-FFF2-40B4-BE49-F238E27FC236}">
+                <a16:creationId xmlns:a16="http://schemas.microsoft.com/office/drawing/2014/main" id="{6DA370DD-2C48-FA9A-9B4E-79087A15B58D}"/>
+              </a:ext>
+            </a:extLst>
+          </p:cNvPr>
+          <p:cNvSpPr txBox="1">
+            <a:spLocks/>
+          </p:cNvSpPr>
+          <p:nvPr/>
+        </p:nvSpPr>
+        <p:spPr>
+          <a:xfrm>
+            <a:off x="2503612" y="1449161"/>
+            <a:ext cx="5672918" cy="747704"/>
+          </a:xfrm>
+          <a:prstGeom prst="rect">
+            <a:avLst/>
+          </a:prstGeom>
+        </p:spPr>
+        <p:txBody>
+          <a:bodyPr vert="horz" lIns="91440" tIns="45720" rIns="91440" bIns="45720" rtlCol="0">
+            <a:normAutofit/>
+          </a:bodyPr>
+          <a:lstStyle>
+            <a:lvl1pPr marL="228600" indent="-228600" algn="l" defTabSz="914400" rtl="0" eaLnBrk="1" latinLnBrk="0" hangingPunct="1">
+              <a:lnSpc>
+                <a:spcPct val="90000"/>
+              </a:lnSpc>
+              <a:spcBef>
+                <a:spcPts val="1000"/>
+              </a:spcBef>
+              <a:buFont typeface="Arial" panose="020B0604020202020204" pitchFamily="34" charset="0"/>
+              <a:buChar char="•"/>
+              <a:defRPr sz="2800" kern="1200">
+                <a:solidFill>
+                  <a:schemeClr val="tx1"/>
+                </a:solidFill>
+                <a:latin typeface="+mn-lt"/>
+                <a:ea typeface="+mn-ea"/>
+                <a:cs typeface="+mn-cs"/>
+              </a:defRPr>
+            </a:lvl1pPr>
+            <a:lvl2pPr marL="685800" indent="-228600" algn="l" defTabSz="914400" rtl="0" eaLnBrk="1" latinLnBrk="0" hangingPunct="1">
+              <a:lnSpc>
+                <a:spcPct val="90000"/>
+              </a:lnSpc>
+              <a:spcBef>
+                <a:spcPts val="500"/>
+              </a:spcBef>
+              <a:buFont typeface="Arial" panose="020B0604020202020204" pitchFamily="34" charset="0"/>
+              <a:buChar char="•"/>
+              <a:defRPr sz="2400" kern="1200">
+                <a:solidFill>
+                  <a:schemeClr val="tx1"/>
+                </a:solidFill>
+                <a:latin typeface="+mn-lt"/>
+                <a:ea typeface="+mn-ea"/>
+                <a:cs typeface="+mn-cs"/>
+              </a:defRPr>
+            </a:lvl2pPr>
+            <a:lvl3pPr marL="1143000" indent="-228600" algn="l" defTabSz="914400" rtl="0" eaLnBrk="1" latinLnBrk="0" hangingPunct="1">
+              <a:lnSpc>
+                <a:spcPct val="90000"/>
+              </a:lnSpc>
+              <a:spcBef>
+                <a:spcPts val="500"/>
+              </a:spcBef>
+              <a:buFont typeface="Arial" panose="020B0604020202020204" pitchFamily="34" charset="0"/>
+              <a:buChar char="•"/>
+              <a:defRPr sz="2000" kern="1200">
+                <a:solidFill>
+                  <a:schemeClr val="tx1"/>
+                </a:solidFill>
+                <a:latin typeface="+mn-lt"/>
+                <a:ea typeface="+mn-ea"/>
+                <a:cs typeface="+mn-cs"/>
+              </a:defRPr>
+            </a:lvl3pPr>
+            <a:lvl4pPr marL="1600200" indent="-228600" algn="l" defTabSz="914400" rtl="0" eaLnBrk="1" latinLnBrk="0" hangingPunct="1">
+              <a:lnSpc>
+                <a:spcPct val="90000"/>
+              </a:lnSpc>
+              <a:spcBef>
+                <a:spcPts val="500"/>
+              </a:spcBef>
+              <a:buFont typeface="Arial" panose="020B0604020202020204" pitchFamily="34" charset="0"/>
+              <a:buChar char="•"/>
+              <a:defRPr sz="1800" kern="1200">
+                <a:solidFill>
+                  <a:schemeClr val="tx1"/>
+                </a:solidFill>
+                <a:latin typeface="+mn-lt"/>
+                <a:ea typeface="+mn-ea"/>
+                <a:cs typeface="+mn-cs"/>
+              </a:defRPr>
+            </a:lvl4pPr>
+            <a:lvl5pPr marL="2057400" indent="-228600" algn="l" defTabSz="914400" rtl="0" eaLnBrk="1" latinLnBrk="0" hangingPunct="1">
+              <a:lnSpc>
+                <a:spcPct val="90000"/>
+              </a:lnSpc>
+              <a:spcBef>
+                <a:spcPts val="500"/>
+              </a:spcBef>
+              <a:buFont typeface="Arial" panose="020B0604020202020204" pitchFamily="34" charset="0"/>
+              <a:buChar char="•"/>
+              <a:defRPr sz="1800" kern="1200">
+                <a:solidFill>
+                  <a:schemeClr val="tx1"/>
+                </a:solidFill>
+                <a:latin typeface="+mn-lt"/>
+                <a:ea typeface="+mn-ea"/>
+                <a:cs typeface="+mn-cs"/>
+              </a:defRPr>
+            </a:lvl5pPr>
+            <a:lvl6pPr marL="2514600" indent="-228600" algn="l" defTabSz="914400" rtl="0" eaLnBrk="1" latinLnBrk="0" hangingPunct="1">
+              <a:lnSpc>
+                <a:spcPct val="90000"/>
+              </a:lnSpc>
+              <a:spcBef>
+                <a:spcPts val="500"/>
+              </a:spcBef>
+              <a:buFont typeface="Arial" panose="020B0604020202020204" pitchFamily="34" charset="0"/>
+              <a:buChar char="•"/>
+              <a:defRPr sz="1800" kern="1200">
+                <a:solidFill>
+                  <a:schemeClr val="tx1"/>
+                </a:solidFill>
+                <a:latin typeface="+mn-lt"/>
+                <a:ea typeface="+mn-ea"/>
+                <a:cs typeface="+mn-cs"/>
+              </a:defRPr>
+            </a:lvl6pPr>
+            <a:lvl7pPr marL="2971800" indent="-228600" algn="l" defTabSz="914400" rtl="0" eaLnBrk="1" latinLnBrk="0" hangingPunct="1">
+              <a:lnSpc>
+                <a:spcPct val="90000"/>
+              </a:lnSpc>
+              <a:spcBef>
+                <a:spcPts val="500"/>
+              </a:spcBef>
+              <a:buFont typeface="Arial" panose="020B0604020202020204" pitchFamily="34" charset="0"/>
+              <a:buChar char="•"/>
+              <a:defRPr sz="1800" kern="1200">
+                <a:solidFill>
+                  <a:schemeClr val="tx1"/>
+                </a:solidFill>
+                <a:latin typeface="+mn-lt"/>
+                <a:ea typeface="+mn-ea"/>
+                <a:cs typeface="+mn-cs"/>
+              </a:defRPr>
+            </a:lvl7pPr>
+            <a:lvl8pPr marL="3429000" indent="-228600" algn="l" defTabSz="914400" rtl="0" eaLnBrk="1" latinLnBrk="0" hangingPunct="1">
+              <a:lnSpc>
+                <a:spcPct val="90000"/>
+              </a:lnSpc>
+              <a:spcBef>
+                <a:spcPts val="500"/>
+              </a:spcBef>
+              <a:buFont typeface="Arial" panose="020B0604020202020204" pitchFamily="34" charset="0"/>
+              <a:buChar char="•"/>
+              <a:defRPr sz="1800" kern="1200">
+                <a:solidFill>
+                  <a:schemeClr val="tx1"/>
+                </a:solidFill>
+                <a:latin typeface="+mn-lt"/>
+                <a:ea typeface="+mn-ea"/>
+                <a:cs typeface="+mn-cs"/>
+              </a:defRPr>
+            </a:lvl8pPr>
+            <a:lvl9pPr marL="3886200" indent="-228600" algn="l" defTabSz="914400" rtl="0" eaLnBrk="1" latinLnBrk="0" hangingPunct="1">
+              <a:lnSpc>
+                <a:spcPct val="90000"/>
+              </a:lnSpc>
+              <a:spcBef>
+                <a:spcPts val="500"/>
+              </a:spcBef>
+              <a:buFont typeface="Arial" panose="020B0604020202020204" pitchFamily="34" charset="0"/>
+              <a:buChar char="•"/>
+              <a:defRPr sz="1800" kern="1200">
+                <a:solidFill>
+                  <a:schemeClr val="tx1"/>
+                </a:solidFill>
+                <a:latin typeface="+mn-lt"/>
+                <a:ea typeface="+mn-ea"/>
+                <a:cs typeface="+mn-cs"/>
+              </a:defRPr>
+            </a:lvl9pPr>
+          </a:lstStyle>
+          <a:p>
+            <a:pPr marL="0" indent="0">
+              <a:buNone/>
+            </a:pPr>
+            <a:r>
+              <a:rPr lang="en-US" sz="2000" dirty="0">
+                <a:latin typeface="Bahnschrift SemiCondensed" panose="020B0502040204020203" pitchFamily="34" charset="0"/>
+              </a:rPr>
+              <a:t>As for MPSs,</a:t>
+            </a:r>
+            <a:r>
+              <a:rPr lang="en-US" sz="2000" noProof="0" dirty="0">
+                <a:latin typeface="Bahnschrift SemiCondensed" panose="020B0502040204020203" pitchFamily="34" charset="0"/>
+              </a:rPr>
+              <a:t> MPOs can come in canonical forms [2].</a:t>
+            </a:r>
+            <a:endParaRPr lang="en-US" sz="2000" noProof="0" dirty="0"/>
+          </a:p>
+        </p:txBody>
+      </p:sp>
+      <p:pic>
+        <p:nvPicPr>
+          <p:cNvPr id="11" name="Picture 10">
+            <a:extLst>
+              <a:ext uri="{FF2B5EF4-FFF2-40B4-BE49-F238E27FC236}">
+                <a16:creationId xmlns:a16="http://schemas.microsoft.com/office/drawing/2014/main" id="{AB972CDB-66E1-E8AE-5562-55DED34DE1DB}"/>
+              </a:ext>
+            </a:extLst>
+          </p:cNvPr>
+          <p:cNvPicPr>
+            <a:picLocks noChangeAspect="1"/>
+          </p:cNvPicPr>
+          <p:nvPr/>
+        </p:nvPicPr>
+        <p:blipFill>
+          <a:blip r:embed="rId6">
+            <a:extLst>
+              <a:ext uri="{28A0092B-C50C-407E-A947-70E740481C1C}">
+                <a14:useLocalDpi xmlns:a14="http://schemas.microsoft.com/office/drawing/2010/main" val="0"/>
+              </a:ext>
+            </a:extLst>
+          </a:blip>
+          <a:stretch>
+            <a:fillRect/>
+          </a:stretch>
+        </p:blipFill>
+        <p:spPr>
+          <a:xfrm>
+            <a:off x="3753246" y="1945546"/>
+            <a:ext cx="3651933" cy="1325861"/>
+          </a:xfrm>
+          <a:prstGeom prst="rect">
+            <a:avLst/>
+          </a:prstGeom>
+        </p:spPr>
+      </p:pic>
+      <p:pic>
+        <p:nvPicPr>
+          <p:cNvPr id="13" name="Picture 12">
+            <a:extLst>
+              <a:ext uri="{FF2B5EF4-FFF2-40B4-BE49-F238E27FC236}">
+                <a16:creationId xmlns:a16="http://schemas.microsoft.com/office/drawing/2014/main" id="{EE18640B-A122-BC24-340F-B587470CFDCF}"/>
+              </a:ext>
+            </a:extLst>
+          </p:cNvPr>
+          <p:cNvPicPr>
+            <a:picLocks noChangeAspect="1"/>
+          </p:cNvPicPr>
+          <p:nvPr/>
+        </p:nvPicPr>
+        <p:blipFill>
+          <a:blip r:embed="rId7">
+            <a:extLst>
+              <a:ext uri="{28A0092B-C50C-407E-A947-70E740481C1C}">
+                <a14:useLocalDpi xmlns:a14="http://schemas.microsoft.com/office/drawing/2010/main" val="0"/>
+              </a:ext>
+            </a:extLst>
+          </a:blip>
+          <a:stretch>
+            <a:fillRect/>
+          </a:stretch>
+        </p:blipFill>
+        <p:spPr>
+          <a:xfrm>
+            <a:off x="7481161" y="2583765"/>
+            <a:ext cx="3096995" cy="2145949"/>
+          </a:xfrm>
+          <a:prstGeom prst="rect">
+            <a:avLst/>
+          </a:prstGeom>
+        </p:spPr>
+      </p:pic>
+      <p:sp>
+        <p:nvSpPr>
+          <p:cNvPr id="14" name="Untertitel 2 6 2">
+            <a:extLst>
+              <a:ext uri="{FF2B5EF4-FFF2-40B4-BE49-F238E27FC236}">
+                <a16:creationId xmlns:a16="http://schemas.microsoft.com/office/drawing/2014/main" id="{10653BBC-AC72-9D8C-550A-09A9496D0892}"/>
+              </a:ext>
+            </a:extLst>
+          </p:cNvPr>
+          <p:cNvSpPr txBox="1">
+            <a:spLocks/>
+          </p:cNvSpPr>
+          <p:nvPr/>
+        </p:nvSpPr>
+        <p:spPr>
+          <a:xfrm>
+            <a:off x="2454945" y="3450605"/>
+            <a:ext cx="5076126" cy="1094831"/>
+          </a:xfrm>
+          <a:prstGeom prst="rect">
+            <a:avLst/>
+          </a:prstGeom>
+        </p:spPr>
+        <p:txBody>
+          <a:bodyPr vert="horz" lIns="91440" tIns="45720" rIns="91440" bIns="45720" rtlCol="0">
+            <a:normAutofit/>
+          </a:bodyPr>
+          <a:lstStyle>
+            <a:lvl1pPr marL="228600" indent="-228600" algn="l" defTabSz="914400" rtl="0" eaLnBrk="1" latinLnBrk="0" hangingPunct="1">
+              <a:lnSpc>
+                <a:spcPct val="90000"/>
+              </a:lnSpc>
+              <a:spcBef>
+                <a:spcPts val="1000"/>
+              </a:spcBef>
+              <a:buFont typeface="Arial" panose="020B0604020202020204" pitchFamily="34" charset="0"/>
+              <a:buChar char="•"/>
+              <a:defRPr sz="2800" kern="1200">
+                <a:solidFill>
+                  <a:schemeClr val="tx1"/>
+                </a:solidFill>
+                <a:latin typeface="+mn-lt"/>
+                <a:ea typeface="+mn-ea"/>
+                <a:cs typeface="+mn-cs"/>
+              </a:defRPr>
+            </a:lvl1pPr>
+            <a:lvl2pPr marL="685800" indent="-228600" algn="l" defTabSz="914400" rtl="0" eaLnBrk="1" latinLnBrk="0" hangingPunct="1">
+              <a:lnSpc>
+                <a:spcPct val="90000"/>
+              </a:lnSpc>
+              <a:spcBef>
+                <a:spcPts val="500"/>
+              </a:spcBef>
+              <a:buFont typeface="Arial" panose="020B0604020202020204" pitchFamily="34" charset="0"/>
+              <a:buChar char="•"/>
+              <a:defRPr sz="2400" kern="1200">
+                <a:solidFill>
+                  <a:schemeClr val="tx1"/>
+                </a:solidFill>
+                <a:latin typeface="+mn-lt"/>
+                <a:ea typeface="+mn-ea"/>
+                <a:cs typeface="+mn-cs"/>
+              </a:defRPr>
+            </a:lvl2pPr>
+            <a:lvl3pPr marL="1143000" indent="-228600" algn="l" defTabSz="914400" rtl="0" eaLnBrk="1" latinLnBrk="0" hangingPunct="1">
+              <a:lnSpc>
+                <a:spcPct val="90000"/>
+              </a:lnSpc>
+              <a:spcBef>
+                <a:spcPts val="500"/>
+              </a:spcBef>
+              <a:buFont typeface="Arial" panose="020B0604020202020204" pitchFamily="34" charset="0"/>
+              <a:buChar char="•"/>
+              <a:defRPr sz="2000" kern="1200">
+                <a:solidFill>
+                  <a:schemeClr val="tx1"/>
+                </a:solidFill>
+                <a:latin typeface="+mn-lt"/>
+                <a:ea typeface="+mn-ea"/>
+                <a:cs typeface="+mn-cs"/>
+              </a:defRPr>
+            </a:lvl3pPr>
+            <a:lvl4pPr marL="1600200" indent="-228600" algn="l" defTabSz="914400" rtl="0" eaLnBrk="1" latinLnBrk="0" hangingPunct="1">
+              <a:lnSpc>
+                <a:spcPct val="90000"/>
+              </a:lnSpc>
+              <a:spcBef>
+                <a:spcPts val="500"/>
+              </a:spcBef>
+              <a:buFont typeface="Arial" panose="020B0604020202020204" pitchFamily="34" charset="0"/>
+              <a:buChar char="•"/>
+              <a:defRPr sz="1800" kern="1200">
+                <a:solidFill>
+                  <a:schemeClr val="tx1"/>
+                </a:solidFill>
+                <a:latin typeface="+mn-lt"/>
+                <a:ea typeface="+mn-ea"/>
+                <a:cs typeface="+mn-cs"/>
+              </a:defRPr>
+            </a:lvl4pPr>
+            <a:lvl5pPr marL="2057400" indent="-228600" algn="l" defTabSz="914400" rtl="0" eaLnBrk="1" latinLnBrk="0" hangingPunct="1">
+              <a:lnSpc>
+                <a:spcPct val="90000"/>
+              </a:lnSpc>
+              <a:spcBef>
+                <a:spcPts val="500"/>
+              </a:spcBef>
+              <a:buFont typeface="Arial" panose="020B0604020202020204" pitchFamily="34" charset="0"/>
+              <a:buChar char="•"/>
+              <a:defRPr sz="1800" kern="1200">
+                <a:solidFill>
+                  <a:schemeClr val="tx1"/>
+                </a:solidFill>
+                <a:latin typeface="+mn-lt"/>
+                <a:ea typeface="+mn-ea"/>
+                <a:cs typeface="+mn-cs"/>
+              </a:defRPr>
+            </a:lvl5pPr>
+            <a:lvl6pPr marL="2514600" indent="-228600" algn="l" defTabSz="914400" rtl="0" eaLnBrk="1" latinLnBrk="0" hangingPunct="1">
+              <a:lnSpc>
+                <a:spcPct val="90000"/>
+              </a:lnSpc>
+              <a:spcBef>
+                <a:spcPts val="500"/>
+              </a:spcBef>
+              <a:buFont typeface="Arial" panose="020B0604020202020204" pitchFamily="34" charset="0"/>
+              <a:buChar char="•"/>
+              <a:defRPr sz="1800" kern="1200">
+                <a:solidFill>
+                  <a:schemeClr val="tx1"/>
+                </a:solidFill>
+                <a:latin typeface="+mn-lt"/>
+                <a:ea typeface="+mn-ea"/>
+                <a:cs typeface="+mn-cs"/>
+              </a:defRPr>
+            </a:lvl6pPr>
+            <a:lvl7pPr marL="2971800" indent="-228600" algn="l" defTabSz="914400" rtl="0" eaLnBrk="1" latinLnBrk="0" hangingPunct="1">
+              <a:lnSpc>
+                <a:spcPct val="90000"/>
+              </a:lnSpc>
+              <a:spcBef>
+                <a:spcPts val="500"/>
+              </a:spcBef>
+              <a:buFont typeface="Arial" panose="020B0604020202020204" pitchFamily="34" charset="0"/>
+              <a:buChar char="•"/>
+              <a:defRPr sz="1800" kern="1200">
+                <a:solidFill>
+                  <a:schemeClr val="tx1"/>
+                </a:solidFill>
+                <a:latin typeface="+mn-lt"/>
+                <a:ea typeface="+mn-ea"/>
+                <a:cs typeface="+mn-cs"/>
+              </a:defRPr>
+            </a:lvl7pPr>
+            <a:lvl8pPr marL="3429000" indent="-228600" algn="l" defTabSz="914400" rtl="0" eaLnBrk="1" latinLnBrk="0" hangingPunct="1">
+              <a:lnSpc>
+                <a:spcPct val="90000"/>
+              </a:lnSpc>
+              <a:spcBef>
+                <a:spcPts val="500"/>
+              </a:spcBef>
+              <a:buFont typeface="Arial" panose="020B0604020202020204" pitchFamily="34" charset="0"/>
+              <a:buChar char="•"/>
+              <a:defRPr sz="1800" kern="1200">
+                <a:solidFill>
+                  <a:schemeClr val="tx1"/>
+                </a:solidFill>
+                <a:latin typeface="+mn-lt"/>
+                <a:ea typeface="+mn-ea"/>
+                <a:cs typeface="+mn-cs"/>
+              </a:defRPr>
+            </a:lvl8pPr>
+            <a:lvl9pPr marL="3886200" indent="-228600" algn="l" defTabSz="914400" rtl="0" eaLnBrk="1" latinLnBrk="0" hangingPunct="1">
+              <a:lnSpc>
+                <a:spcPct val="90000"/>
+              </a:lnSpc>
+              <a:spcBef>
+                <a:spcPts val="500"/>
+              </a:spcBef>
+              <a:buFont typeface="Arial" panose="020B0604020202020204" pitchFamily="34" charset="0"/>
+              <a:buChar char="•"/>
+              <a:defRPr sz="1800" kern="1200">
+                <a:solidFill>
+                  <a:schemeClr val="tx1"/>
+                </a:solidFill>
+                <a:latin typeface="+mn-lt"/>
+                <a:ea typeface="+mn-ea"/>
+                <a:cs typeface="+mn-cs"/>
+              </a:defRPr>
+            </a:lvl9pPr>
+          </a:lstStyle>
+          <a:p>
+            <a:pPr marL="0" indent="0">
+              <a:buNone/>
+            </a:pPr>
+            <a:r>
+              <a:rPr lang="en-US" sz="2000" dirty="0">
+                <a:latin typeface="Bahnschrift SemiCondensed" panose="020B0502040204020203" pitchFamily="34" charset="0"/>
+              </a:rPr>
+              <a:t>The above MPO is said to be in left-</a:t>
+            </a:r>
+            <a:r>
+              <a:rPr lang="en-US" sz="2000" noProof="0" dirty="0">
+                <a:latin typeface="Bahnschrift SemiCondensed" panose="020B0502040204020203" pitchFamily="34" charset="0"/>
+              </a:rPr>
+              <a:t>canonical form </a:t>
+            </a:r>
+            <a:r>
+              <a:rPr lang="en-US" sz="2000" noProof="0" dirty="0" err="1">
+                <a:latin typeface="Bahnschrift SemiCondensed" panose="020B0502040204020203" pitchFamily="34" charset="0"/>
+              </a:rPr>
+              <a:t>iff</a:t>
+            </a:r>
+            <a:r>
+              <a:rPr lang="en-US" sz="2000" noProof="0" dirty="0">
+                <a:latin typeface="Bahnschrift SemiCondensed" panose="020B0502040204020203" pitchFamily="34" charset="0"/>
+              </a:rPr>
+              <a:t> the single-site tensors                         </a:t>
+            </a:r>
+            <a:r>
+              <a:rPr lang="en-US" sz="2000" dirty="0">
+                <a:latin typeface="Bahnschrift SemiCondensed" panose="020B0502040204020203" pitchFamily="34" charset="0"/>
+              </a:rPr>
+              <a:t>have the following isometry property:</a:t>
+            </a:r>
+            <a:endParaRPr lang="en-US" sz="2000" noProof="0" dirty="0">
+              <a:latin typeface="Bahnschrift SemiCondensed" panose="020B0502040204020203" pitchFamily="34" charset="0"/>
+            </a:endParaRPr>
+          </a:p>
+        </p:txBody>
+      </p:sp>
+      <p:pic>
+        <p:nvPicPr>
+          <p:cNvPr id="18" name="Picture 17">
+            <a:extLst>
+              <a:ext uri="{FF2B5EF4-FFF2-40B4-BE49-F238E27FC236}">
+                <a16:creationId xmlns:a16="http://schemas.microsoft.com/office/drawing/2014/main" id="{C292C61C-B3B0-658E-12A9-FD296DF1582D}"/>
+              </a:ext>
+            </a:extLst>
+          </p:cNvPr>
+          <p:cNvPicPr>
+            <a:picLocks noChangeAspect="1"/>
+          </p:cNvPicPr>
+          <p:nvPr>
+            <p:custDataLst>
+              <p:tags r:id="rId2"/>
+            </p:custDataLst>
+          </p:nvPr>
+        </p:nvPicPr>
+        <p:blipFill>
+          <a:blip r:embed="rId8">
+            <a:extLst>
+              <a:ext uri="{28A0092B-C50C-407E-A947-70E740481C1C}">
+                <a14:useLocalDpi xmlns:a14="http://schemas.microsoft.com/office/drawing/2010/main" val="0"/>
+              </a:ext>
+            </a:extLst>
+          </a:blip>
+          <a:stretch>
+            <a:fillRect/>
+          </a:stretch>
+        </p:blipFill>
+        <p:spPr>
+          <a:xfrm>
+            <a:off x="5627922" y="3799788"/>
+            <a:ext cx="1393952" cy="219456"/>
+          </a:xfrm>
+          <a:prstGeom prst="rect">
+            <a:avLst/>
+          </a:prstGeom>
+        </p:spPr>
+      </p:pic>
+      <p:sp>
+        <p:nvSpPr>
+          <p:cNvPr id="19" name="Untertitel 2 6">
+            <a:extLst>
+              <a:ext uri="{FF2B5EF4-FFF2-40B4-BE49-F238E27FC236}">
+                <a16:creationId xmlns:a16="http://schemas.microsoft.com/office/drawing/2014/main" id="{D6EC9DD3-CA7F-6525-9AD2-D4CAD197E54D}"/>
+              </a:ext>
+            </a:extLst>
+          </p:cNvPr>
+          <p:cNvSpPr txBox="1">
+            <a:spLocks/>
+          </p:cNvSpPr>
+          <p:nvPr/>
+        </p:nvSpPr>
+        <p:spPr>
+          <a:xfrm>
+            <a:off x="2454944" y="4835514"/>
+            <a:ext cx="9005535" cy="866840"/>
+          </a:xfrm>
+          <a:prstGeom prst="rect">
+            <a:avLst/>
+          </a:prstGeom>
+        </p:spPr>
+        <p:txBody>
+          <a:bodyPr vert="horz" lIns="91440" tIns="45720" rIns="91440" bIns="45720" rtlCol="0">
+            <a:normAutofit/>
+          </a:bodyPr>
+          <a:lstStyle>
+            <a:lvl1pPr marL="228600" indent="-228600" algn="l" defTabSz="914400" rtl="0" eaLnBrk="1" latinLnBrk="0" hangingPunct="1">
+              <a:lnSpc>
+                <a:spcPct val="90000"/>
+              </a:lnSpc>
+              <a:spcBef>
+                <a:spcPts val="1000"/>
+              </a:spcBef>
+              <a:buFont typeface="Arial" panose="020B0604020202020204" pitchFamily="34" charset="0"/>
+              <a:buChar char="•"/>
+              <a:defRPr sz="2800" kern="1200">
+                <a:solidFill>
+                  <a:schemeClr val="tx1"/>
+                </a:solidFill>
+                <a:latin typeface="+mn-lt"/>
+                <a:ea typeface="+mn-ea"/>
+                <a:cs typeface="+mn-cs"/>
+              </a:defRPr>
+            </a:lvl1pPr>
+            <a:lvl2pPr marL="685800" indent="-228600" algn="l" defTabSz="914400" rtl="0" eaLnBrk="1" latinLnBrk="0" hangingPunct="1">
+              <a:lnSpc>
+                <a:spcPct val="90000"/>
+              </a:lnSpc>
+              <a:spcBef>
+                <a:spcPts val="500"/>
+              </a:spcBef>
+              <a:buFont typeface="Arial" panose="020B0604020202020204" pitchFamily="34" charset="0"/>
+              <a:buChar char="•"/>
+              <a:defRPr sz="2400" kern="1200">
+                <a:solidFill>
+                  <a:schemeClr val="tx1"/>
+                </a:solidFill>
+                <a:latin typeface="+mn-lt"/>
+                <a:ea typeface="+mn-ea"/>
+                <a:cs typeface="+mn-cs"/>
+              </a:defRPr>
+            </a:lvl2pPr>
+            <a:lvl3pPr marL="1143000" indent="-228600" algn="l" defTabSz="914400" rtl="0" eaLnBrk="1" latinLnBrk="0" hangingPunct="1">
+              <a:lnSpc>
+                <a:spcPct val="90000"/>
+              </a:lnSpc>
+              <a:spcBef>
+                <a:spcPts val="500"/>
+              </a:spcBef>
+              <a:buFont typeface="Arial" panose="020B0604020202020204" pitchFamily="34" charset="0"/>
+              <a:buChar char="•"/>
+              <a:defRPr sz="2000" kern="1200">
+                <a:solidFill>
+                  <a:schemeClr val="tx1"/>
+                </a:solidFill>
+                <a:latin typeface="+mn-lt"/>
+                <a:ea typeface="+mn-ea"/>
+                <a:cs typeface="+mn-cs"/>
+              </a:defRPr>
+            </a:lvl3pPr>
+            <a:lvl4pPr marL="1600200" indent="-228600" algn="l" defTabSz="914400" rtl="0" eaLnBrk="1" latinLnBrk="0" hangingPunct="1">
+              <a:lnSpc>
+                <a:spcPct val="90000"/>
+              </a:lnSpc>
+              <a:spcBef>
+                <a:spcPts val="500"/>
+              </a:spcBef>
+              <a:buFont typeface="Arial" panose="020B0604020202020204" pitchFamily="34" charset="0"/>
+              <a:buChar char="•"/>
+              <a:defRPr sz="1800" kern="1200">
+                <a:solidFill>
+                  <a:schemeClr val="tx1"/>
+                </a:solidFill>
+                <a:latin typeface="+mn-lt"/>
+                <a:ea typeface="+mn-ea"/>
+                <a:cs typeface="+mn-cs"/>
+              </a:defRPr>
+            </a:lvl4pPr>
+            <a:lvl5pPr marL="2057400" indent="-228600" algn="l" defTabSz="914400" rtl="0" eaLnBrk="1" latinLnBrk="0" hangingPunct="1">
+              <a:lnSpc>
+                <a:spcPct val="90000"/>
+              </a:lnSpc>
+              <a:spcBef>
+                <a:spcPts val="500"/>
+              </a:spcBef>
+              <a:buFont typeface="Arial" panose="020B0604020202020204" pitchFamily="34" charset="0"/>
+              <a:buChar char="•"/>
+              <a:defRPr sz="1800" kern="1200">
+                <a:solidFill>
+                  <a:schemeClr val="tx1"/>
+                </a:solidFill>
+                <a:latin typeface="+mn-lt"/>
+                <a:ea typeface="+mn-ea"/>
+                <a:cs typeface="+mn-cs"/>
+              </a:defRPr>
+            </a:lvl5pPr>
+            <a:lvl6pPr marL="2514600" indent="-228600" algn="l" defTabSz="914400" rtl="0" eaLnBrk="1" latinLnBrk="0" hangingPunct="1">
+              <a:lnSpc>
+                <a:spcPct val="90000"/>
+              </a:lnSpc>
+              <a:spcBef>
+                <a:spcPts val="500"/>
+              </a:spcBef>
+              <a:buFont typeface="Arial" panose="020B0604020202020204" pitchFamily="34" charset="0"/>
+              <a:buChar char="•"/>
+              <a:defRPr sz="1800" kern="1200">
+                <a:solidFill>
+                  <a:schemeClr val="tx1"/>
+                </a:solidFill>
+                <a:latin typeface="+mn-lt"/>
+                <a:ea typeface="+mn-ea"/>
+                <a:cs typeface="+mn-cs"/>
+              </a:defRPr>
+            </a:lvl6pPr>
+            <a:lvl7pPr marL="2971800" indent="-228600" algn="l" defTabSz="914400" rtl="0" eaLnBrk="1" latinLnBrk="0" hangingPunct="1">
+              <a:lnSpc>
+                <a:spcPct val="90000"/>
+              </a:lnSpc>
+              <a:spcBef>
+                <a:spcPts val="500"/>
+              </a:spcBef>
+              <a:buFont typeface="Arial" panose="020B0604020202020204" pitchFamily="34" charset="0"/>
+              <a:buChar char="•"/>
+              <a:defRPr sz="1800" kern="1200">
+                <a:solidFill>
+                  <a:schemeClr val="tx1"/>
+                </a:solidFill>
+                <a:latin typeface="+mn-lt"/>
+                <a:ea typeface="+mn-ea"/>
+                <a:cs typeface="+mn-cs"/>
+              </a:defRPr>
+            </a:lvl7pPr>
+            <a:lvl8pPr marL="3429000" indent="-228600" algn="l" defTabSz="914400" rtl="0" eaLnBrk="1" latinLnBrk="0" hangingPunct="1">
+              <a:lnSpc>
+                <a:spcPct val="90000"/>
+              </a:lnSpc>
+              <a:spcBef>
+                <a:spcPts val="500"/>
+              </a:spcBef>
+              <a:buFont typeface="Arial" panose="020B0604020202020204" pitchFamily="34" charset="0"/>
+              <a:buChar char="•"/>
+              <a:defRPr sz="1800" kern="1200">
+                <a:solidFill>
+                  <a:schemeClr val="tx1"/>
+                </a:solidFill>
+                <a:latin typeface="+mn-lt"/>
+                <a:ea typeface="+mn-ea"/>
+                <a:cs typeface="+mn-cs"/>
+              </a:defRPr>
+            </a:lvl8pPr>
+            <a:lvl9pPr marL="3886200" indent="-228600" algn="l" defTabSz="914400" rtl="0" eaLnBrk="1" latinLnBrk="0" hangingPunct="1">
+              <a:lnSpc>
+                <a:spcPct val="90000"/>
+              </a:lnSpc>
+              <a:spcBef>
+                <a:spcPts val="500"/>
+              </a:spcBef>
+              <a:buFont typeface="Arial" panose="020B0604020202020204" pitchFamily="34" charset="0"/>
+              <a:buChar char="•"/>
+              <a:defRPr sz="1800" kern="1200">
+                <a:solidFill>
+                  <a:schemeClr val="tx1"/>
+                </a:solidFill>
+                <a:latin typeface="+mn-lt"/>
+                <a:ea typeface="+mn-ea"/>
+                <a:cs typeface="+mn-cs"/>
+              </a:defRPr>
+            </a:lvl9pPr>
+          </a:lstStyle>
+          <a:p>
+            <a:pPr marL="0" indent="0">
+              <a:buNone/>
+            </a:pPr>
+            <a:r>
+              <a:rPr lang="en-US" sz="2000" dirty="0">
+                <a:latin typeface="Bahnschrift SemiCondensed" panose="020B0502040204020203" pitchFamily="34" charset="0"/>
+              </a:rPr>
+              <a:t>Similarly, there exist left- and site-canonical forms of MPOs. Like for MPSs, a given MPO can be brought to a canonical form, e.g., by successive QR or SVD decompositions.</a:t>
+            </a:r>
+            <a:endParaRPr lang="en-US" sz="2000" noProof="0" dirty="0"/>
+          </a:p>
+        </p:txBody>
+      </p:sp>
+      <p:sp>
+        <p:nvSpPr>
+          <p:cNvPr id="20" name="Untertitel 2 2">
+            <a:extLst>
+              <a:ext uri="{FF2B5EF4-FFF2-40B4-BE49-F238E27FC236}">
+                <a16:creationId xmlns:a16="http://schemas.microsoft.com/office/drawing/2014/main" id="{D2F13A4B-98D6-4CEF-7253-DBC72C627D8F}"/>
+              </a:ext>
+            </a:extLst>
+          </p:cNvPr>
+          <p:cNvSpPr txBox="1">
+            <a:spLocks/>
+          </p:cNvSpPr>
+          <p:nvPr/>
+        </p:nvSpPr>
+        <p:spPr>
+          <a:xfrm>
+            <a:off x="440578" y="5616865"/>
+            <a:ext cx="1971335" cy="1094831"/>
+          </a:xfrm>
+          <a:prstGeom prst="rect">
+            <a:avLst/>
+          </a:prstGeom>
+        </p:spPr>
+        <p:txBody>
+          <a:bodyPr vert="horz" lIns="91440" tIns="45720" rIns="91440" bIns="45720" rtlCol="0">
+            <a:normAutofit/>
+          </a:bodyPr>
+          <a:lstStyle>
+            <a:lvl1pPr marL="228600" indent="-228600" algn="l" defTabSz="914400" rtl="0" eaLnBrk="1" latinLnBrk="0" hangingPunct="1">
+              <a:lnSpc>
+                <a:spcPct val="90000"/>
+              </a:lnSpc>
+              <a:spcBef>
+                <a:spcPts val="1000"/>
+              </a:spcBef>
+              <a:buFont typeface="Arial" panose="020B0604020202020204" pitchFamily="34" charset="0"/>
+              <a:buChar char="•"/>
+              <a:defRPr sz="2800" kern="1200">
+                <a:solidFill>
+                  <a:schemeClr val="tx1"/>
+                </a:solidFill>
+                <a:latin typeface="+mn-lt"/>
+                <a:ea typeface="+mn-ea"/>
+                <a:cs typeface="+mn-cs"/>
+              </a:defRPr>
+            </a:lvl1pPr>
+            <a:lvl2pPr marL="685800" indent="-228600" algn="l" defTabSz="914400" rtl="0" eaLnBrk="1" latinLnBrk="0" hangingPunct="1">
+              <a:lnSpc>
+                <a:spcPct val="90000"/>
+              </a:lnSpc>
+              <a:spcBef>
+                <a:spcPts val="500"/>
+              </a:spcBef>
+              <a:buFont typeface="Arial" panose="020B0604020202020204" pitchFamily="34" charset="0"/>
+              <a:buChar char="•"/>
+              <a:defRPr sz="2400" kern="1200">
+                <a:solidFill>
+                  <a:schemeClr val="tx1"/>
+                </a:solidFill>
+                <a:latin typeface="+mn-lt"/>
+                <a:ea typeface="+mn-ea"/>
+                <a:cs typeface="+mn-cs"/>
+              </a:defRPr>
+            </a:lvl2pPr>
+            <a:lvl3pPr marL="1143000" indent="-228600" algn="l" defTabSz="914400" rtl="0" eaLnBrk="1" latinLnBrk="0" hangingPunct="1">
+              <a:lnSpc>
+                <a:spcPct val="90000"/>
+              </a:lnSpc>
+              <a:spcBef>
+                <a:spcPts val="500"/>
+              </a:spcBef>
+              <a:buFont typeface="Arial" panose="020B0604020202020204" pitchFamily="34" charset="0"/>
+              <a:buChar char="•"/>
+              <a:defRPr sz="2000" kern="1200">
+                <a:solidFill>
+                  <a:schemeClr val="tx1"/>
+                </a:solidFill>
+                <a:latin typeface="+mn-lt"/>
+                <a:ea typeface="+mn-ea"/>
+                <a:cs typeface="+mn-cs"/>
+              </a:defRPr>
+            </a:lvl3pPr>
+            <a:lvl4pPr marL="1600200" indent="-228600" algn="l" defTabSz="914400" rtl="0" eaLnBrk="1" latinLnBrk="0" hangingPunct="1">
+              <a:lnSpc>
+                <a:spcPct val="90000"/>
+              </a:lnSpc>
+              <a:spcBef>
+                <a:spcPts val="500"/>
+              </a:spcBef>
+              <a:buFont typeface="Arial" panose="020B0604020202020204" pitchFamily="34" charset="0"/>
+              <a:buChar char="•"/>
+              <a:defRPr sz="1800" kern="1200">
+                <a:solidFill>
+                  <a:schemeClr val="tx1"/>
+                </a:solidFill>
+                <a:latin typeface="+mn-lt"/>
+                <a:ea typeface="+mn-ea"/>
+                <a:cs typeface="+mn-cs"/>
+              </a:defRPr>
+            </a:lvl4pPr>
+            <a:lvl5pPr marL="2057400" indent="-228600" algn="l" defTabSz="914400" rtl="0" eaLnBrk="1" latinLnBrk="0" hangingPunct="1">
+              <a:lnSpc>
+                <a:spcPct val="90000"/>
+              </a:lnSpc>
+              <a:spcBef>
+                <a:spcPts val="500"/>
+              </a:spcBef>
+              <a:buFont typeface="Arial" panose="020B0604020202020204" pitchFamily="34" charset="0"/>
+              <a:buChar char="•"/>
+              <a:defRPr sz="1800" kern="1200">
+                <a:solidFill>
+                  <a:schemeClr val="tx1"/>
+                </a:solidFill>
+                <a:latin typeface="+mn-lt"/>
+                <a:ea typeface="+mn-ea"/>
+                <a:cs typeface="+mn-cs"/>
+              </a:defRPr>
+            </a:lvl5pPr>
+            <a:lvl6pPr marL="2514600" indent="-228600" algn="l" defTabSz="914400" rtl="0" eaLnBrk="1" latinLnBrk="0" hangingPunct="1">
+              <a:lnSpc>
+                <a:spcPct val="90000"/>
+              </a:lnSpc>
+              <a:spcBef>
+                <a:spcPts val="500"/>
+              </a:spcBef>
+              <a:buFont typeface="Arial" panose="020B0604020202020204" pitchFamily="34" charset="0"/>
+              <a:buChar char="•"/>
+              <a:defRPr sz="1800" kern="1200">
+                <a:solidFill>
+                  <a:schemeClr val="tx1"/>
+                </a:solidFill>
+                <a:latin typeface="+mn-lt"/>
+                <a:ea typeface="+mn-ea"/>
+                <a:cs typeface="+mn-cs"/>
+              </a:defRPr>
+            </a:lvl6pPr>
+            <a:lvl7pPr marL="2971800" indent="-228600" algn="l" defTabSz="914400" rtl="0" eaLnBrk="1" latinLnBrk="0" hangingPunct="1">
+              <a:lnSpc>
+                <a:spcPct val="90000"/>
+              </a:lnSpc>
+              <a:spcBef>
+                <a:spcPts val="500"/>
+              </a:spcBef>
+              <a:buFont typeface="Arial" panose="020B0604020202020204" pitchFamily="34" charset="0"/>
+              <a:buChar char="•"/>
+              <a:defRPr sz="1800" kern="1200">
+                <a:solidFill>
+                  <a:schemeClr val="tx1"/>
+                </a:solidFill>
+                <a:latin typeface="+mn-lt"/>
+                <a:ea typeface="+mn-ea"/>
+                <a:cs typeface="+mn-cs"/>
+              </a:defRPr>
+            </a:lvl7pPr>
+            <a:lvl8pPr marL="3429000" indent="-228600" algn="l" defTabSz="914400" rtl="0" eaLnBrk="1" latinLnBrk="0" hangingPunct="1">
+              <a:lnSpc>
+                <a:spcPct val="90000"/>
+              </a:lnSpc>
+              <a:spcBef>
+                <a:spcPts val="500"/>
+              </a:spcBef>
+              <a:buFont typeface="Arial" panose="020B0604020202020204" pitchFamily="34" charset="0"/>
+              <a:buChar char="•"/>
+              <a:defRPr sz="1800" kern="1200">
+                <a:solidFill>
+                  <a:schemeClr val="tx1"/>
+                </a:solidFill>
+                <a:latin typeface="+mn-lt"/>
+                <a:ea typeface="+mn-ea"/>
+                <a:cs typeface="+mn-cs"/>
+              </a:defRPr>
+            </a:lvl8pPr>
+            <a:lvl9pPr marL="3886200" indent="-228600" algn="l" defTabSz="914400" rtl="0" eaLnBrk="1" latinLnBrk="0" hangingPunct="1">
+              <a:lnSpc>
+                <a:spcPct val="90000"/>
+              </a:lnSpc>
+              <a:spcBef>
+                <a:spcPts val="500"/>
+              </a:spcBef>
+              <a:buFont typeface="Arial" panose="020B0604020202020204" pitchFamily="34" charset="0"/>
+              <a:buChar char="•"/>
+              <a:defRPr sz="1800" kern="1200">
+                <a:solidFill>
+                  <a:schemeClr val="tx1"/>
+                </a:solidFill>
+                <a:latin typeface="+mn-lt"/>
+                <a:ea typeface="+mn-ea"/>
+                <a:cs typeface="+mn-cs"/>
+              </a:defRPr>
+            </a:lvl9pPr>
+          </a:lstStyle>
+          <a:p>
+            <a:pPr marL="0" indent="0">
+              <a:buNone/>
+            </a:pPr>
+            <a:r>
+              <a:rPr lang="en-US" sz="2400" noProof="0" dirty="0">
+                <a:solidFill>
+                  <a:schemeClr val="tx2">
+                    <a:lumMod val="75000"/>
+                    <a:lumOff val="25000"/>
+                  </a:schemeClr>
+                </a:solidFill>
+                <a:latin typeface="Bahnschrift SemiCondensed" panose="020B0502040204020203" pitchFamily="34" charset="0"/>
+              </a:rPr>
+              <a:t>Connection with MPSs</a:t>
+            </a:r>
+            <a:endParaRPr lang="en-US" sz="2400" noProof="0" dirty="0">
+              <a:solidFill>
+                <a:schemeClr val="tx2">
+                  <a:lumMod val="75000"/>
+                  <a:lumOff val="25000"/>
+                </a:schemeClr>
+              </a:solidFill>
+            </a:endParaRPr>
+          </a:p>
+        </p:txBody>
+      </p:sp>
+      <p:sp>
+        <p:nvSpPr>
+          <p:cNvPr id="21" name="Untertitel 2 6">
+            <a:extLst>
+              <a:ext uri="{FF2B5EF4-FFF2-40B4-BE49-F238E27FC236}">
+                <a16:creationId xmlns:a16="http://schemas.microsoft.com/office/drawing/2014/main" id="{AA5B3724-8240-50C6-6990-F8237AE9849A}"/>
+              </a:ext>
+            </a:extLst>
+          </p:cNvPr>
+          <p:cNvSpPr txBox="1">
+            <a:spLocks/>
+          </p:cNvSpPr>
+          <p:nvPr/>
+        </p:nvSpPr>
+        <p:spPr>
+          <a:xfrm>
+            <a:off x="2454944" y="5698868"/>
+            <a:ext cx="9468832" cy="753819"/>
+          </a:xfrm>
+          <a:prstGeom prst="rect">
+            <a:avLst/>
+          </a:prstGeom>
+        </p:spPr>
+        <p:txBody>
+          <a:bodyPr vert="horz" lIns="91440" tIns="45720" rIns="91440" bIns="45720" rtlCol="0">
+            <a:normAutofit/>
+          </a:bodyPr>
+          <a:lstStyle>
+            <a:lvl1pPr marL="228600" indent="-228600" algn="l" defTabSz="914400" rtl="0" eaLnBrk="1" latinLnBrk="0" hangingPunct="1">
+              <a:lnSpc>
+                <a:spcPct val="90000"/>
+              </a:lnSpc>
+              <a:spcBef>
+                <a:spcPts val="1000"/>
+              </a:spcBef>
+              <a:buFont typeface="Arial" panose="020B0604020202020204" pitchFamily="34" charset="0"/>
+              <a:buChar char="•"/>
+              <a:defRPr sz="2800" kern="1200">
+                <a:solidFill>
+                  <a:schemeClr val="tx1"/>
+                </a:solidFill>
+                <a:latin typeface="+mn-lt"/>
+                <a:ea typeface="+mn-ea"/>
+                <a:cs typeface="+mn-cs"/>
+              </a:defRPr>
+            </a:lvl1pPr>
+            <a:lvl2pPr marL="685800" indent="-228600" algn="l" defTabSz="914400" rtl="0" eaLnBrk="1" latinLnBrk="0" hangingPunct="1">
+              <a:lnSpc>
+                <a:spcPct val="90000"/>
+              </a:lnSpc>
+              <a:spcBef>
+                <a:spcPts val="500"/>
+              </a:spcBef>
+              <a:buFont typeface="Arial" panose="020B0604020202020204" pitchFamily="34" charset="0"/>
+              <a:buChar char="•"/>
+              <a:defRPr sz="2400" kern="1200">
+                <a:solidFill>
+                  <a:schemeClr val="tx1"/>
+                </a:solidFill>
+                <a:latin typeface="+mn-lt"/>
+                <a:ea typeface="+mn-ea"/>
+                <a:cs typeface="+mn-cs"/>
+              </a:defRPr>
+            </a:lvl2pPr>
+            <a:lvl3pPr marL="1143000" indent="-228600" algn="l" defTabSz="914400" rtl="0" eaLnBrk="1" latinLnBrk="0" hangingPunct="1">
+              <a:lnSpc>
+                <a:spcPct val="90000"/>
+              </a:lnSpc>
+              <a:spcBef>
+                <a:spcPts val="500"/>
+              </a:spcBef>
+              <a:buFont typeface="Arial" panose="020B0604020202020204" pitchFamily="34" charset="0"/>
+              <a:buChar char="•"/>
+              <a:defRPr sz="2000" kern="1200">
+                <a:solidFill>
+                  <a:schemeClr val="tx1"/>
+                </a:solidFill>
+                <a:latin typeface="+mn-lt"/>
+                <a:ea typeface="+mn-ea"/>
+                <a:cs typeface="+mn-cs"/>
+              </a:defRPr>
+            </a:lvl3pPr>
+            <a:lvl4pPr marL="1600200" indent="-228600" algn="l" defTabSz="914400" rtl="0" eaLnBrk="1" latinLnBrk="0" hangingPunct="1">
+              <a:lnSpc>
+                <a:spcPct val="90000"/>
+              </a:lnSpc>
+              <a:spcBef>
+                <a:spcPts val="500"/>
+              </a:spcBef>
+              <a:buFont typeface="Arial" panose="020B0604020202020204" pitchFamily="34" charset="0"/>
+              <a:buChar char="•"/>
+              <a:defRPr sz="1800" kern="1200">
+                <a:solidFill>
+                  <a:schemeClr val="tx1"/>
+                </a:solidFill>
+                <a:latin typeface="+mn-lt"/>
+                <a:ea typeface="+mn-ea"/>
+                <a:cs typeface="+mn-cs"/>
+              </a:defRPr>
+            </a:lvl4pPr>
+            <a:lvl5pPr marL="2057400" indent="-228600" algn="l" defTabSz="914400" rtl="0" eaLnBrk="1" latinLnBrk="0" hangingPunct="1">
+              <a:lnSpc>
+                <a:spcPct val="90000"/>
+              </a:lnSpc>
+              <a:spcBef>
+                <a:spcPts val="500"/>
+              </a:spcBef>
+              <a:buFont typeface="Arial" panose="020B0604020202020204" pitchFamily="34" charset="0"/>
+              <a:buChar char="•"/>
+              <a:defRPr sz="1800" kern="1200">
+                <a:solidFill>
+                  <a:schemeClr val="tx1"/>
+                </a:solidFill>
+                <a:latin typeface="+mn-lt"/>
+                <a:ea typeface="+mn-ea"/>
+                <a:cs typeface="+mn-cs"/>
+              </a:defRPr>
+            </a:lvl5pPr>
+            <a:lvl6pPr marL="2514600" indent="-228600" algn="l" defTabSz="914400" rtl="0" eaLnBrk="1" latinLnBrk="0" hangingPunct="1">
+              <a:lnSpc>
+                <a:spcPct val="90000"/>
+              </a:lnSpc>
+              <a:spcBef>
+                <a:spcPts val="500"/>
+              </a:spcBef>
+              <a:buFont typeface="Arial" panose="020B0604020202020204" pitchFamily="34" charset="0"/>
+              <a:buChar char="•"/>
+              <a:defRPr sz="1800" kern="1200">
+                <a:solidFill>
+                  <a:schemeClr val="tx1"/>
+                </a:solidFill>
+                <a:latin typeface="+mn-lt"/>
+                <a:ea typeface="+mn-ea"/>
+                <a:cs typeface="+mn-cs"/>
+              </a:defRPr>
+            </a:lvl6pPr>
+            <a:lvl7pPr marL="2971800" indent="-228600" algn="l" defTabSz="914400" rtl="0" eaLnBrk="1" latinLnBrk="0" hangingPunct="1">
+              <a:lnSpc>
+                <a:spcPct val="90000"/>
+              </a:lnSpc>
+              <a:spcBef>
+                <a:spcPts val="500"/>
+              </a:spcBef>
+              <a:buFont typeface="Arial" panose="020B0604020202020204" pitchFamily="34" charset="0"/>
+              <a:buChar char="•"/>
+              <a:defRPr sz="1800" kern="1200">
+                <a:solidFill>
+                  <a:schemeClr val="tx1"/>
+                </a:solidFill>
+                <a:latin typeface="+mn-lt"/>
+                <a:ea typeface="+mn-ea"/>
+                <a:cs typeface="+mn-cs"/>
+              </a:defRPr>
+            </a:lvl7pPr>
+            <a:lvl8pPr marL="3429000" indent="-228600" algn="l" defTabSz="914400" rtl="0" eaLnBrk="1" latinLnBrk="0" hangingPunct="1">
+              <a:lnSpc>
+                <a:spcPct val="90000"/>
+              </a:lnSpc>
+              <a:spcBef>
+                <a:spcPts val="500"/>
+              </a:spcBef>
+              <a:buFont typeface="Arial" panose="020B0604020202020204" pitchFamily="34" charset="0"/>
+              <a:buChar char="•"/>
+              <a:defRPr sz="1800" kern="1200">
+                <a:solidFill>
+                  <a:schemeClr val="tx1"/>
+                </a:solidFill>
+                <a:latin typeface="+mn-lt"/>
+                <a:ea typeface="+mn-ea"/>
+                <a:cs typeface="+mn-cs"/>
+              </a:defRPr>
+            </a:lvl8pPr>
+            <a:lvl9pPr marL="3886200" indent="-228600" algn="l" defTabSz="914400" rtl="0" eaLnBrk="1" latinLnBrk="0" hangingPunct="1">
+              <a:lnSpc>
+                <a:spcPct val="90000"/>
+              </a:lnSpc>
+              <a:spcBef>
+                <a:spcPts val="500"/>
+              </a:spcBef>
+              <a:buFont typeface="Arial" panose="020B0604020202020204" pitchFamily="34" charset="0"/>
+              <a:buChar char="•"/>
+              <a:defRPr sz="1800" kern="1200">
+                <a:solidFill>
+                  <a:schemeClr val="tx1"/>
+                </a:solidFill>
+                <a:latin typeface="+mn-lt"/>
+                <a:ea typeface="+mn-ea"/>
+                <a:cs typeface="+mn-cs"/>
+              </a:defRPr>
+            </a:lvl9pPr>
+          </a:lstStyle>
+          <a:p>
+            <a:pPr marL="0" indent="0">
+              <a:buNone/>
+            </a:pPr>
+            <a:r>
+              <a:rPr lang="en-US" sz="2000" noProof="0" dirty="0">
+                <a:latin typeface="Bahnschrift SemiCondensed" panose="020B0502040204020203" pitchFamily="34" charset="0"/>
+              </a:rPr>
+              <a:t>MPOs in canonical forms are MPOs </a:t>
+            </a:r>
+            <a:r>
+              <a:rPr lang="en-US" sz="2000" noProof="0" dirty="0" err="1">
+                <a:latin typeface="Bahnschrift SemiCondensed" panose="020B0502040204020203" pitchFamily="34" charset="0"/>
+              </a:rPr>
+              <a:t>s.t.</a:t>
+            </a:r>
+            <a:r>
+              <a:rPr lang="en-US" sz="2000" noProof="0" dirty="0">
+                <a:latin typeface="Bahnschrift SemiCondensed" panose="020B0502040204020203" pitchFamily="34" charset="0"/>
+              </a:rPr>
+              <a:t> merging physical legs yields MPSs in canonical forms!</a:t>
+            </a:r>
+            <a:endParaRPr lang="en-US" sz="2000" noProof="0" dirty="0"/>
           </a:p>
         </p:txBody>
       </p:sp>
@@ -8262,7 +9674,7 @@
       </p:sp>
       <p:sp>
         <p:nvSpPr>
-          <p:cNvPr id="23" name="Untertitel 2 2">
+          <p:cNvPr id="23" name="Untertitel 2 2 1">
             <a:extLst>
               <a:ext uri="{FF2B5EF4-FFF2-40B4-BE49-F238E27FC236}">
                 <a16:creationId xmlns:a16="http://schemas.microsoft.com/office/drawing/2014/main" id="{820BA1E7-D0D9-7488-F767-24EEEDBF120E}"/>
@@ -8480,7 +9892,7 @@
       </p:sp>
       <p:sp>
         <p:nvSpPr>
-          <p:cNvPr id="29" name="Untertitel 2 3">
+          <p:cNvPr id="29" name="Untertitel 2 3 1">
             <a:extLst>
               <a:ext uri="{FF2B5EF4-FFF2-40B4-BE49-F238E27FC236}">
                 <a16:creationId xmlns:a16="http://schemas.microsoft.com/office/drawing/2014/main" id="{39B745FA-D5B2-29C1-3968-C733E40E8459}"/>
@@ -8764,7 +10176,7 @@
       </p:pic>
       <p:sp>
         <p:nvSpPr>
-          <p:cNvPr id="12" name="Untertitel 2 3">
+          <p:cNvPr id="12" name="Untertitel 2 3 2">
             <a:extLst>
               <a:ext uri="{FF2B5EF4-FFF2-40B4-BE49-F238E27FC236}">
                 <a16:creationId xmlns:a16="http://schemas.microsoft.com/office/drawing/2014/main" id="{F0145429-2611-E58B-002B-78C5763C06F6}"/>
@@ -9008,7 +10420,7 @@
       </p:pic>
       <p:sp>
         <p:nvSpPr>
-          <p:cNvPr id="15" name="Untertitel 2 2">
+          <p:cNvPr id="15" name="Untertitel 2 2 2">
             <a:extLst>
               <a:ext uri="{FF2B5EF4-FFF2-40B4-BE49-F238E27FC236}">
                 <a16:creationId xmlns:a16="http://schemas.microsoft.com/office/drawing/2014/main" id="{513F6546-753F-4293-9D70-3FD95AAE0875}"/>
@@ -9845,14 +11257,18 @@
                 <a:latin typeface="Bahnschrift SemiCondensed" panose="020B0502040204020203" pitchFamily="34" charset="0"/>
                 <a:hlinkClick r:id="rId6"/>
               </a:rPr>
-              <a:t>https://doi.org/10.1103/PhysRevB.102.035147</a:t>
+              <a:t>https://doi.org/10.1103/PhysRevB</a:t>
             </a:r>
             <a:r>
-              <a:rPr lang="en-US" sz="2000" dirty="0">
+              <a:rPr lang="en-US" sz="2000">
                 <a:latin typeface="Bahnschrift SemiCondensed" panose="020B0502040204020203" pitchFamily="34" charset="0"/>
+                <a:hlinkClick r:id="rId6"/>
               </a:rPr>
-              <a:t> </a:t>
+              <a:t>.102.035147</a:t>
             </a:r>
+            <a:endParaRPr lang="en-US" sz="2000" dirty="0">
+              <a:latin typeface="Bahnschrift SemiCondensed" panose="020B0502040204020203" pitchFamily="34" charset="0"/>
+            </a:endParaRPr>
           </a:p>
         </p:txBody>
       </p:sp>
@@ -9907,11 +11323,33 @@
 
 <file path=ppt/tags/tag15.xml><?xml version="1.0" encoding="utf-8"?>
 <p:tagLst xmlns:a="http://schemas.openxmlformats.org/drawingml/2006/main" xmlns:r="http://schemas.openxmlformats.org/officeDocument/2006/relationships" xmlns:p="http://schemas.openxmlformats.org/presentationml/2006/main">
+  <p:tag name="OUTPUTDPI" val=" 1200"/>
+  <p:tag name="ORIGINALHEIGHT" val=" 108"/>
+  <p:tag name="ORIGINALWIDTH" val=" 686"/>
+  <p:tag name="OUTPUTTYPE" val="PNG"/>
+  <p:tag name="IGUANATEXVERSION" val="162"/>
+  <p:tag name="LATEXADDIN" val="\documentclass{article}&#10;\usepackage{amsmath}&#10;\pagestyle{empty}&#10;\begin{document}&#10;&#10;$W_1, ..., W_{L-1}$&#10;&#10;&#10;\end{document}"/>
+  <p:tag name="IGUANATEXSIZE" val="20"/>
+  <p:tag name="IGUANATEXCURSOR" val="92"/>
+  <p:tag name="TRANSPARENCY" val="True"/>
+  <p:tag name="CHOOSECOLOR" val="False"/>
+  <p:tag name="COLORHEX" val="000000"/>
+  <p:tag name="LATEXENGINEID" val="0"/>
+  <p:tag name="TEMPFOLDER" val="/private/var/folders/r2/2ny_rjqj5w93mz1ll0gd2vbr0000gp/T/com.microsoft.Powerpoint/TemporaryItems/"/>
+  <p:tag name="LATEXFORMHEIGHT" val=" 426.65"/>
+  <p:tag name="LATEXFORMWIDTH" val=" 513.35"/>
+  <p:tag name="LATEXFORMWRAP" val="True"/>
+  <p:tag name="BITMAPVECTOR" val="0"/>
+</p:tagLst>
+</file>
+
+<file path=ppt/tags/tag16.xml><?xml version="1.0" encoding="utf-8"?>
+<p:tagLst xmlns:a="http://schemas.openxmlformats.org/drawingml/2006/main" xmlns:r="http://schemas.openxmlformats.org/officeDocument/2006/relationships" xmlns:p="http://schemas.openxmlformats.org/presentationml/2006/main">
   <p:tag name="THINKCELLSHAPEDONOTDELETE" val="thinkcellActiveDocDoNotDelete"/>
 </p:tagLst>
 </file>
 
-<file path=ppt/tags/tag16.xml><?xml version="1.0" encoding="utf-8"?>
+<file path=ppt/tags/tag17.xml><?xml version="1.0" encoding="utf-8"?>
 <p:tagLst xmlns:a="http://schemas.openxmlformats.org/drawingml/2006/main" xmlns:r="http://schemas.openxmlformats.org/officeDocument/2006/relationships" xmlns:p="http://schemas.openxmlformats.org/presentationml/2006/main">
   <p:tag name="OUTPUTDPI" val="1200"/>
   <p:tag name="ORIGINALHEIGHT" val="597.6753"/>
@@ -9929,7 +11367,7 @@
 </p:tagLst>
 </file>
 
-<file path=ppt/tags/tag17.xml><?xml version="1.0" encoding="utf-8"?>
+<file path=ppt/tags/tag18.xml><?xml version="1.0" encoding="utf-8"?>
 <p:tagLst xmlns:a="http://schemas.openxmlformats.org/drawingml/2006/main" xmlns:r="http://schemas.openxmlformats.org/officeDocument/2006/relationships" xmlns:p="http://schemas.openxmlformats.org/presentationml/2006/main">
   <p:tag name="OUTPUTDPI" val="1200"/>
   <p:tag name="ORIGINALHEIGHT" val="172.4784"/>
@@ -9947,7 +11385,7 @@
 </p:tagLst>
 </file>
 
-<file path=ppt/tags/tag18.xml><?xml version="1.0" encoding="utf-8"?>
+<file path=ppt/tags/tag19.xml><?xml version="1.0" encoding="utf-8"?>
 <p:tagLst xmlns:a="http://schemas.openxmlformats.org/drawingml/2006/main" xmlns:r="http://schemas.openxmlformats.org/officeDocument/2006/relationships" xmlns:p="http://schemas.openxmlformats.org/presentationml/2006/main">
   <p:tag name="OUTPUTDPI" val=" 1200"/>
   <p:tag name="ORIGINALHEIGHT" val=" 159.73"/>
@@ -9969,7 +11407,13 @@
 </p:tagLst>
 </file>
 
-<file path=ppt/tags/tag19.xml><?xml version="1.0" encoding="utf-8"?>
+<file path=ppt/tags/tag2.xml><?xml version="1.0" encoding="utf-8"?>
+<p:tagLst xmlns:a="http://schemas.openxmlformats.org/drawingml/2006/main" xmlns:r="http://schemas.openxmlformats.org/officeDocument/2006/relationships" xmlns:p="http://schemas.openxmlformats.org/presentationml/2006/main">
+  <p:tag name="THINKCELLSHAPEDONOTDELETE" val="thinkcellActiveDocDoNotDelete"/>
+</p:tagLst>
+</file>
+
+<file path=ppt/tags/tag20.xml><?xml version="1.0" encoding="utf-8"?>
 <p:tagLst xmlns:a="http://schemas.openxmlformats.org/drawingml/2006/main" xmlns:r="http://schemas.openxmlformats.org/officeDocument/2006/relationships" xmlns:p="http://schemas.openxmlformats.org/presentationml/2006/main">
   <p:tag name="OUTPUTDPI" val=" 1200"/>
   <p:tag name="ORIGINALHEIGHT" val=" 126.7342"/>
@@ -9991,13 +11435,7 @@
 </p:tagLst>
 </file>
 
-<file path=ppt/tags/tag2.xml><?xml version="1.0" encoding="utf-8"?>
-<p:tagLst xmlns:a="http://schemas.openxmlformats.org/drawingml/2006/main" xmlns:r="http://schemas.openxmlformats.org/officeDocument/2006/relationships" xmlns:p="http://schemas.openxmlformats.org/presentationml/2006/main">
-  <p:tag name="THINKCELLSHAPEDONOTDELETE" val="thinkcellActiveDocDoNotDelete"/>
-</p:tagLst>
-</file>
-
-<file path=ppt/tags/tag20.xml><?xml version="1.0" encoding="utf-8"?>
+<file path=ppt/tags/tag21.xml><?xml version="1.0" encoding="utf-8"?>
 <p:tagLst xmlns:a="http://schemas.openxmlformats.org/drawingml/2006/main" xmlns:r="http://schemas.openxmlformats.org/officeDocument/2006/relationships" xmlns:p="http://schemas.openxmlformats.org/presentationml/2006/main">
   <p:tag name="OUTPUTDPI" val=" 1200"/>
   <p:tag name="ORIGINALHEIGHT" val=" 117.7353"/>
@@ -10019,7 +11457,7 @@
 </p:tagLst>
 </file>
 
-<file path=ppt/tags/tag21.xml><?xml version="1.0" encoding="utf-8"?>
+<file path=ppt/tags/tag22.xml><?xml version="1.0" encoding="utf-8"?>
 <p:tagLst xmlns:a="http://schemas.openxmlformats.org/drawingml/2006/main" xmlns:r="http://schemas.openxmlformats.org/officeDocument/2006/relationships" xmlns:p="http://schemas.openxmlformats.org/presentationml/2006/main">
   <p:tag name="OUTPUTDPI" val=" 1200"/>
   <p:tag name="ORIGINALHEIGHT" val=" 113.2358"/>
@@ -10041,7 +11479,7 @@
 </p:tagLst>
 </file>
 
-<file path=ppt/tags/tag22.xml><?xml version="1.0" encoding="utf-8"?>
+<file path=ppt/tags/tag23.xml><?xml version="1.0" encoding="utf-8"?>
 <p:tagLst xmlns:a="http://schemas.openxmlformats.org/drawingml/2006/main" xmlns:r="http://schemas.openxmlformats.org/officeDocument/2006/relationships" xmlns:p="http://schemas.openxmlformats.org/presentationml/2006/main">
   <p:tag name="OUTPUTDPI" val=" 1200"/>
   <p:tag name="ORIGINALHEIGHT" val=" 141.7323"/>
@@ -10063,13 +11501,13 @@
 </p:tagLst>
 </file>
 
-<file path=ppt/tags/tag23.xml><?xml version="1.0" encoding="utf-8"?>
+<file path=ppt/tags/tag24.xml><?xml version="1.0" encoding="utf-8"?>
 <p:tagLst xmlns:a="http://schemas.openxmlformats.org/drawingml/2006/main" xmlns:r="http://schemas.openxmlformats.org/officeDocument/2006/relationships" xmlns:p="http://schemas.openxmlformats.org/presentationml/2006/main">
   <p:tag name="THINKCELLSHAPEDONOTDELETE" val="thinkcellActiveDocDoNotDelete"/>
 </p:tagLst>
 </file>
 
-<file path=ppt/tags/tag24.xml><?xml version="1.0" encoding="utf-8"?>
+<file path=ppt/tags/tag25.xml><?xml version="1.0" encoding="utf-8"?>
 <p:tagLst xmlns:a="http://schemas.openxmlformats.org/drawingml/2006/main" xmlns:r="http://schemas.openxmlformats.org/officeDocument/2006/relationships" xmlns:p="http://schemas.openxmlformats.org/presentationml/2006/main">
   <p:tag name="OUTPUTDPI" val=" 1200"/>
   <p:tag name="ORIGINALHEIGHT" val=" 125.2343"/>
@@ -10091,7 +11529,7 @@
 </p:tagLst>
 </file>
 
-<file path=ppt/tags/tag25.xml><?xml version="1.0" encoding="utf-8"?>
+<file path=ppt/tags/tag26.xml><?xml version="1.0" encoding="utf-8"?>
 <p:tagLst xmlns:a="http://schemas.openxmlformats.org/drawingml/2006/main" xmlns:r="http://schemas.openxmlformats.org/officeDocument/2006/relationships" xmlns:p="http://schemas.openxmlformats.org/presentationml/2006/main">
   <p:tag name="OUTPUTDPI" val=" 1200"/>
   <p:tag name="ORIGINALHEIGHT" val=" 159.73"/>
@@ -10113,7 +11551,7 @@
 </p:tagLst>
 </file>
 
-<file path=ppt/tags/tag26.xml><?xml version="1.0" encoding="utf-8"?>
+<file path=ppt/tags/tag27.xml><?xml version="1.0" encoding="utf-8"?>
 <p:tagLst xmlns:a="http://schemas.openxmlformats.org/drawingml/2006/main" xmlns:r="http://schemas.openxmlformats.org/officeDocument/2006/relationships" xmlns:p="http://schemas.openxmlformats.org/presentationml/2006/main">
   <p:tag name="OUTPUTDPI" val=" 1200"/>
   <p:tag name="ORIGINALHEIGHT" val=" 90.73866"/>
@@ -10135,7 +11573,7 @@
 </p:tagLst>
 </file>
 
-<file path=ppt/tags/tag27.xml><?xml version="1.0" encoding="utf-8"?>
+<file path=ppt/tags/tag28.xml><?xml version="1.0" encoding="utf-8"?>
 <p:tagLst xmlns:a="http://schemas.openxmlformats.org/drawingml/2006/main" xmlns:r="http://schemas.openxmlformats.org/officeDocument/2006/relationships" xmlns:p="http://schemas.openxmlformats.org/presentationml/2006/main">
   <p:tag name="THINKCELLSHAPEDONOTDELETE" val="thinkcellActiveDocDoNotDelete"/>
 </p:tagLst>

</xml_diff>